<commit_message>
updated Recommendation slides in the presentation deck
</commit_message>
<xml_diff>
--- a/presentation/Team-25_Sam.pptx
+++ b/presentation/Team-25_Sam.pptx
@@ -5,7 +5,7 @@
     <p:sldMasterId id="2147483950" r:id="rId1"/>
   </p:sldMasterIdLst>
   <p:notesMasterIdLst>
-    <p:notesMasterId r:id="rId36"/>
+    <p:notesMasterId r:id="rId38"/>
   </p:notesMasterIdLst>
   <p:sldIdLst>
     <p:sldId id="257" r:id="rId2"/>
@@ -39,9 +39,11 @@
     <p:sldId id="282" r:id="rId30"/>
     <p:sldId id="277" r:id="rId31"/>
     <p:sldId id="308" r:id="rId32"/>
-    <p:sldId id="279" r:id="rId33"/>
-    <p:sldId id="278" r:id="rId34"/>
-    <p:sldId id="281" r:id="rId35"/>
+    <p:sldId id="310" r:id="rId33"/>
+    <p:sldId id="309" r:id="rId34"/>
+    <p:sldId id="279" r:id="rId35"/>
+    <p:sldId id="278" r:id="rId36"/>
+    <p:sldId id="281" r:id="rId37"/>
   </p:sldIdLst>
   <p:sldSz cx="12192000" cy="6858000"/>
   <p:notesSz cx="6858000" cy="9144000"/>
@@ -10200,7 +10202,7 @@
           <a:p>
             <a:r>
               <a:rPr lang="en-US" dirty="0"/>
-              <a:t>Recommendations</a:t>
+              <a:t>Recommendation: Suicide Prevention Strategy</a:t>
             </a:r>
           </a:p>
         </p:txBody>
@@ -10224,109 +10226,25 @@
         <p:spPr/>
         <p:txBody>
           <a:bodyPr>
-            <a:normAutofit fontScale="47500" lnSpcReduction="20000"/>
+            <a:normAutofit fontScale="92500" lnSpcReduction="20000"/>
           </a:bodyPr>
           <a:lstStyle/>
           <a:p>
             <a:r>
               <a:rPr lang="en-US" dirty="0"/>
-              <a:t>Suicide Prevention Strategy</a:t>
-            </a:r>
-          </a:p>
-          <a:p>
-            <a:pPr lvl="1"/>
-            <a:r>
-              <a:rPr lang="en-US" dirty="0"/>
               <a:t>Consider establishing an authoritative agency, tasked with the continued investigating, formulating, and implementing policy aimed at reducing suicide. Due to the complexity of the suicide problem, this agency must draw on knowledge from many disciplines, including mental health, medical sciences, and economics, to identify affirmative actions and best practices in suicide prevention. </a:t>
             </a:r>
           </a:p>
           <a:p>
-            <a:pPr lvl="1"/>
             <a:r>
               <a:rPr lang="en-US" dirty="0"/>
               <a:t>Consider implementing a national strategy for suicide prevention, which should not be intended to replace existing strategies or frameworks already in place in local municipalities, territories, provinces, states, etc. This strategy can include, but is not limited to, the establishing of a national suicide crisis line as well as suicide prevention and care services. </a:t>
             </a:r>
           </a:p>
           <a:p>
-            <a:pPr lvl="1"/>
             <a:r>
               <a:rPr lang="en-US" dirty="0"/>
               <a:t>Promote public awareness campaigns highlighting the prevalence of suicide. By changing public perceptions and reducing the stigmas associated with seeking help, the rate of suicide can be reduced. </a:t>
-            </a:r>
-          </a:p>
-          <a:p>
-            <a:r>
-              <a:rPr lang="en-US" dirty="0"/>
-              <a:t>Reduce Alcohol Consumption</a:t>
-            </a:r>
-          </a:p>
-          <a:p>
-            <a:pPr lvl="1"/>
-            <a:r>
-              <a:rPr lang="en-US" dirty="0"/>
-              <a:t>Suicide is a complex societal problem with no singular cause. However, harmful use of alcohol is among the major risk factors for suicide.</a:t>
-            </a:r>
-          </a:p>
-          <a:p>
-            <a:pPr lvl="1"/>
-            <a:r>
-              <a:rPr lang="en-US" dirty="0"/>
-              <a:t>Policy makers should consider implementing measures designed to mitigate the harmful use of alcohol as a means of reducing the rate of suicide.</a:t>
-            </a:r>
-          </a:p>
-          <a:p>
-            <a:pPr lvl="1"/>
-            <a:r>
-              <a:rPr lang="en-US" dirty="0"/>
-              <a:t>According to the WHO, these policy interventions have proven effective at reducing the harmful use of alcohol:</a:t>
-            </a:r>
-          </a:p>
-          <a:p>
-            <a:pPr lvl="2"/>
-            <a:r>
-              <a:rPr lang="en-US" dirty="0"/>
-              <a:t>Increase the price of alcohol via taxation</a:t>
-            </a:r>
-          </a:p>
-          <a:p>
-            <a:pPr lvl="2"/>
-            <a:r>
-              <a:rPr lang="en-US" dirty="0"/>
-              <a:t>Enact and enforce restrictions on alcohol advertising (across multiple types of media) </a:t>
-            </a:r>
-          </a:p>
-          <a:p>
-            <a:pPr lvl="2"/>
-            <a:r>
-              <a:rPr lang="en-US" dirty="0"/>
-              <a:t>Enact and enforce restrictions on the physical availability of retailed alcohol (via reduced hours of sale) </a:t>
-            </a:r>
-          </a:p>
-          <a:p>
-            <a:r>
-              <a:rPr lang="en-US" dirty="0"/>
-              <a:t>GDP: ensure income security</a:t>
-            </a:r>
-          </a:p>
-          <a:p>
-            <a:pPr lvl="1"/>
-            <a:r>
-              <a:rPr lang="en-US" dirty="0"/>
-              <a:t>Pursue measures aimed at improving the nation’s financial standing, attractiveness for investment, and rate of business startup as a means for improving the overall economic climate. By enacting policy aimed at improving economic conditions, poverty is reduced thereby reducing the rate of suicide.</a:t>
-            </a:r>
-          </a:p>
-          <a:p>
-            <a:pPr lvl="1"/>
-            <a:r>
-              <a:rPr lang="en-US" dirty="0"/>
-              <a:t>Remove unnecessary or unclear laws that could be preventing the startup of business and industry. Ensure that policy is clear and unambiguous so that businesses know if, and when, they are in violation of the law. </a:t>
-            </a:r>
-          </a:p>
-          <a:p>
-            <a:pPr lvl="1"/>
-            <a:r>
-              <a:rPr lang="en-US" dirty="0"/>
-              <a:t>By improving the economic output of the country and the percentage of GDP per capita, the impact of economic factors, as a cause of suicide, will be reduced. Thus reducing the rate of suicide.</a:t>
             </a:r>
           </a:p>
         </p:txBody>
@@ -10366,7 +10284,7 @@
           <p:cNvPr id="2" name="Title 1">
             <a:extLst>
               <a:ext uri="{FF2B5EF4-FFF2-40B4-BE49-F238E27FC236}">
-                <a16:creationId xmlns:a16="http://schemas.microsoft.com/office/drawing/2014/main" id="{624DC2CB-8BD0-C849-B52E-0F91A40C741E}"/>
+                <a16:creationId xmlns:a16="http://schemas.microsoft.com/office/drawing/2014/main" id="{C445C081-E43A-4B0F-B379-6FCC88A896FF}"/>
               </a:ext>
             </a:extLst>
           </p:cNvPr>
@@ -10384,7 +10302,7 @@
           <a:p>
             <a:r>
               <a:rPr lang="en-US" dirty="0"/>
-              <a:t>What kind of Country Level Decision Making Support This Analysis Provides</a:t>
+              <a:t>Recommendation: Reduce Alcohol Consumption</a:t>
             </a:r>
           </a:p>
         </p:txBody>
@@ -10394,7 +10312,7 @@
           <p:cNvPr id="3" name="Content Placeholder 2">
             <a:extLst>
               <a:ext uri="{FF2B5EF4-FFF2-40B4-BE49-F238E27FC236}">
-                <a16:creationId xmlns:a16="http://schemas.microsoft.com/office/drawing/2014/main" id="{399E939B-CD29-D445-B69B-5A724813DF0B}"/>
+                <a16:creationId xmlns:a16="http://schemas.microsoft.com/office/drawing/2014/main" id="{BE3821F0-D455-4F30-B26E-E0C1D891A9D7}"/>
               </a:ext>
             </a:extLst>
           </p:cNvPr>
@@ -10407,56 +10325,55 @@
         </p:nvSpPr>
         <p:spPr/>
         <p:txBody>
-          <a:bodyPr/>
-          <a:lstStyle/>
-          <a:p>
-            <a:r>
-              <a:rPr lang="en-US" dirty="0"/>
-              <a:t>Justify investment and potential impact of decision making</a:t>
-            </a:r>
-          </a:p>
-          <a:p>
-            <a:endParaRPr lang="en-US" dirty="0"/>
-          </a:p>
-          <a:p>
-            <a:r>
-              <a:rPr lang="en-US" dirty="0"/>
-              <a:t>Bringing up statistics that would motivate decision makers</a:t>
-            </a:r>
-          </a:p>
-          <a:p>
-            <a:endParaRPr lang="en-US" dirty="0"/>
-          </a:p>
-          <a:p>
-            <a:r>
-              <a:rPr lang="en-US" dirty="0"/>
-              <a:t>Outlining a high-level strategy a country could take</a:t>
-            </a:r>
-          </a:p>
-          <a:p>
-            <a:endParaRPr lang="en-US" dirty="0"/>
-          </a:p>
-          <a:p>
-            <a:r>
-              <a:rPr lang="en-US" dirty="0"/>
-              <a:t>Highlighting where policy makers could invest in additional research to better understand the problem</a:t>
-            </a:r>
-          </a:p>
-          <a:p>
-            <a:endParaRPr lang="en-US" dirty="0"/>
-          </a:p>
-          <a:p>
-            <a:endParaRPr lang="en-US" dirty="0"/>
-          </a:p>
-          <a:p>
-            <a:endParaRPr lang="en-US" dirty="0"/>
+          <a:bodyPr>
+            <a:normAutofit fontScale="92500"/>
+          </a:bodyPr>
+          <a:lstStyle/>
+          <a:p>
+            <a:r>
+              <a:rPr lang="en-US" dirty="0"/>
+              <a:t>Suicide is a complex societal problem with no singular cause. However, harmful use of alcohol is among the major risk factors for suicide.</a:t>
+            </a:r>
+          </a:p>
+          <a:p>
+            <a:r>
+              <a:rPr lang="en-US" dirty="0"/>
+              <a:t>Policy makers should consider implementing measures designed to mitigate the harmful use of alcohol as a means of reducing the rate of suicide.</a:t>
+            </a:r>
+          </a:p>
+          <a:p>
+            <a:r>
+              <a:rPr lang="en-US" dirty="0"/>
+              <a:t>According to the WHO, these policy interventions have proven effective at reducing the harmful use of alcohol:</a:t>
+            </a:r>
+          </a:p>
+          <a:p>
+            <a:pPr lvl="1"/>
+            <a:r>
+              <a:rPr lang="en-US" dirty="0"/>
+              <a:t>Increase the price of alcohol via taxation</a:t>
+            </a:r>
+          </a:p>
+          <a:p>
+            <a:pPr lvl="1"/>
+            <a:r>
+              <a:rPr lang="en-US" dirty="0"/>
+              <a:t>Enact and enforce restrictions on alcohol advertising (across multiple types of media) </a:t>
+            </a:r>
+          </a:p>
+          <a:p>
+            <a:pPr lvl="1"/>
+            <a:r>
+              <a:rPr lang="en-US" dirty="0"/>
+              <a:t>Enact and enforce restrictions on the physical availability of retailed alcohol (via reduced hours of sale)</a:t>
+            </a:r>
           </a:p>
         </p:txBody>
       </p:sp>
     </p:spTree>
     <p:extLst>
       <p:ext uri="{BB962C8B-B14F-4D97-AF65-F5344CB8AC3E}">
-        <p14:creationId xmlns:p14="http://schemas.microsoft.com/office/powerpoint/2010/main" val="19698530"/>
+        <p14:creationId xmlns:p14="http://schemas.microsoft.com/office/powerpoint/2010/main" val="3625365334"/>
       </p:ext>
     </p:extLst>
   </p:cSld>
@@ -10485,6 +10402,231 @@
       </p:grpSpPr>
       <p:sp>
         <p:nvSpPr>
+          <p:cNvPr id="2" name="Title 1">
+            <a:extLst>
+              <a:ext uri="{FF2B5EF4-FFF2-40B4-BE49-F238E27FC236}">
+                <a16:creationId xmlns:a16="http://schemas.microsoft.com/office/drawing/2014/main" id="{FDCD7A5B-4773-4085-B647-73C93DE5D0C2}"/>
+              </a:ext>
+            </a:extLst>
+          </p:cNvPr>
+          <p:cNvSpPr>
+            <a:spLocks noGrp="1"/>
+          </p:cNvSpPr>
+          <p:nvPr>
+            <p:ph type="title"/>
+          </p:nvPr>
+        </p:nvSpPr>
+        <p:spPr/>
+        <p:txBody>
+          <a:bodyPr/>
+          <a:lstStyle/>
+          <a:p>
+            <a:r>
+              <a:rPr lang="en-US" dirty="0"/>
+              <a:t>Recommendation: GDP (ensure income security? or reduce poverty?) </a:t>
+            </a:r>
+          </a:p>
+        </p:txBody>
+      </p:sp>
+      <p:sp>
+        <p:nvSpPr>
+          <p:cNvPr id="3" name="Content Placeholder 2">
+            <a:extLst>
+              <a:ext uri="{FF2B5EF4-FFF2-40B4-BE49-F238E27FC236}">
+                <a16:creationId xmlns:a16="http://schemas.microsoft.com/office/drawing/2014/main" id="{29C6FA89-8EEB-4078-A0C4-CA9C549F2A60}"/>
+              </a:ext>
+            </a:extLst>
+          </p:cNvPr>
+          <p:cNvSpPr>
+            <a:spLocks noGrp="1"/>
+          </p:cNvSpPr>
+          <p:nvPr>
+            <p:ph idx="1"/>
+          </p:nvPr>
+        </p:nvSpPr>
+        <p:spPr/>
+        <p:txBody>
+          <a:bodyPr>
+            <a:normAutofit fontScale="92500"/>
+          </a:bodyPr>
+          <a:lstStyle/>
+          <a:p>
+            <a:r>
+              <a:rPr lang="en-US" dirty="0"/>
+              <a:t>Pursue measures aimed at improving the nation’s financial standing, attractiveness for investment, and rate of business startup as a means for improving the overall economic climate. By enacting policy aimed at improving economic conditions, poverty is reduced thereby reducing the rate of suicide.</a:t>
+            </a:r>
+          </a:p>
+          <a:p>
+            <a:r>
+              <a:rPr lang="en-US" dirty="0"/>
+              <a:t>Remove unnecessary or unclear laws that could be preventing the startup of business and industry. Ensure that policy is clear and unambiguous so that businesses know if, and when, they are in violation of the law. </a:t>
+            </a:r>
+          </a:p>
+          <a:p>
+            <a:r>
+              <a:rPr lang="en-US" dirty="0"/>
+              <a:t>By improving the economic output of the country and the percentage of GDP per capita, the impact of economic factors, as a cause of suicide, will be reduced. Thus reducing the rate of suicide.</a:t>
+            </a:r>
+          </a:p>
+          <a:p>
+            <a:endParaRPr lang="en-US" dirty="0"/>
+          </a:p>
+        </p:txBody>
+      </p:sp>
+    </p:spTree>
+    <p:extLst>
+      <p:ext uri="{BB962C8B-B14F-4D97-AF65-F5344CB8AC3E}">
+        <p14:creationId xmlns:p14="http://schemas.microsoft.com/office/powerpoint/2010/main" val="82016792"/>
+      </p:ext>
+    </p:extLst>
+  </p:cSld>
+  <p:clrMapOvr>
+    <a:masterClrMapping/>
+  </p:clrMapOvr>
+</p:sld>
+</file>
+
+<file path=ppt/slides/slide34.xml><?xml version="1.0" encoding="utf-8"?>
+<p:sld xmlns:a="http://schemas.openxmlformats.org/drawingml/2006/main" xmlns:r="http://schemas.openxmlformats.org/officeDocument/2006/relationships" xmlns:p="http://schemas.openxmlformats.org/presentationml/2006/main">
+  <p:cSld>
+    <p:spTree>
+      <p:nvGrpSpPr>
+        <p:cNvPr id="1" name=""/>
+        <p:cNvGrpSpPr/>
+        <p:nvPr/>
+      </p:nvGrpSpPr>
+      <p:grpSpPr>
+        <a:xfrm>
+          <a:off x="0" y="0"/>
+          <a:ext cx="0" cy="0"/>
+          <a:chOff x="0" y="0"/>
+          <a:chExt cx="0" cy="0"/>
+        </a:xfrm>
+      </p:grpSpPr>
+      <p:sp>
+        <p:nvSpPr>
+          <p:cNvPr id="2" name="Title 1">
+            <a:extLst>
+              <a:ext uri="{FF2B5EF4-FFF2-40B4-BE49-F238E27FC236}">
+                <a16:creationId xmlns:a16="http://schemas.microsoft.com/office/drawing/2014/main" id="{624DC2CB-8BD0-C849-B52E-0F91A40C741E}"/>
+              </a:ext>
+            </a:extLst>
+          </p:cNvPr>
+          <p:cNvSpPr>
+            <a:spLocks noGrp="1"/>
+          </p:cNvSpPr>
+          <p:nvPr>
+            <p:ph type="title"/>
+          </p:nvPr>
+        </p:nvSpPr>
+        <p:spPr/>
+        <p:txBody>
+          <a:bodyPr/>
+          <a:lstStyle/>
+          <a:p>
+            <a:r>
+              <a:rPr lang="en-US" dirty="0"/>
+              <a:t>What kind of Country Level Decision Making Support This Analysis Provides</a:t>
+            </a:r>
+          </a:p>
+        </p:txBody>
+      </p:sp>
+      <p:sp>
+        <p:nvSpPr>
+          <p:cNvPr id="3" name="Content Placeholder 2">
+            <a:extLst>
+              <a:ext uri="{FF2B5EF4-FFF2-40B4-BE49-F238E27FC236}">
+                <a16:creationId xmlns:a16="http://schemas.microsoft.com/office/drawing/2014/main" id="{399E939B-CD29-D445-B69B-5A724813DF0B}"/>
+              </a:ext>
+            </a:extLst>
+          </p:cNvPr>
+          <p:cNvSpPr>
+            <a:spLocks noGrp="1"/>
+          </p:cNvSpPr>
+          <p:nvPr>
+            <p:ph idx="1"/>
+          </p:nvPr>
+        </p:nvSpPr>
+        <p:spPr/>
+        <p:txBody>
+          <a:bodyPr/>
+          <a:lstStyle/>
+          <a:p>
+            <a:r>
+              <a:rPr lang="en-US" dirty="0"/>
+              <a:t>Justify investment and potential impact of decision making</a:t>
+            </a:r>
+          </a:p>
+          <a:p>
+            <a:endParaRPr lang="en-US" dirty="0"/>
+          </a:p>
+          <a:p>
+            <a:r>
+              <a:rPr lang="en-US" dirty="0"/>
+              <a:t>Bringing up statistics that would motivate decision makers</a:t>
+            </a:r>
+          </a:p>
+          <a:p>
+            <a:endParaRPr lang="en-US" dirty="0"/>
+          </a:p>
+          <a:p>
+            <a:r>
+              <a:rPr lang="en-US" dirty="0"/>
+              <a:t>Outlining a high-level strategy a country could take</a:t>
+            </a:r>
+          </a:p>
+          <a:p>
+            <a:endParaRPr lang="en-US" dirty="0"/>
+          </a:p>
+          <a:p>
+            <a:r>
+              <a:rPr lang="en-US" dirty="0"/>
+              <a:t>Highlighting where policy makers could invest in additional research to better understand the problem</a:t>
+            </a:r>
+          </a:p>
+          <a:p>
+            <a:endParaRPr lang="en-US" dirty="0"/>
+          </a:p>
+          <a:p>
+            <a:endParaRPr lang="en-US" dirty="0"/>
+          </a:p>
+          <a:p>
+            <a:endParaRPr lang="en-US" dirty="0"/>
+          </a:p>
+        </p:txBody>
+      </p:sp>
+    </p:spTree>
+    <p:extLst>
+      <p:ext uri="{BB962C8B-B14F-4D97-AF65-F5344CB8AC3E}">
+        <p14:creationId xmlns:p14="http://schemas.microsoft.com/office/powerpoint/2010/main" val="19698530"/>
+      </p:ext>
+    </p:extLst>
+  </p:cSld>
+  <p:clrMapOvr>
+    <a:masterClrMapping/>
+  </p:clrMapOvr>
+</p:sld>
+</file>
+
+<file path=ppt/slides/slide35.xml><?xml version="1.0" encoding="utf-8"?>
+<p:sld xmlns:a="http://schemas.openxmlformats.org/drawingml/2006/main" xmlns:r="http://schemas.openxmlformats.org/officeDocument/2006/relationships" xmlns:p="http://schemas.openxmlformats.org/presentationml/2006/main">
+  <p:cSld>
+    <p:spTree>
+      <p:nvGrpSpPr>
+        <p:cNvPr id="1" name=""/>
+        <p:cNvGrpSpPr/>
+        <p:nvPr/>
+      </p:nvGrpSpPr>
+      <p:grpSpPr>
+        <a:xfrm>
+          <a:off x="0" y="0"/>
+          <a:ext cx="0" cy="0"/>
+          <a:chOff x="0" y="0"/>
+          <a:chExt cx="0" cy="0"/>
+        </a:xfrm>
+      </p:grpSpPr>
+      <p:sp>
+        <p:nvSpPr>
           <p:cNvPr id="4" name="Title 3">
             <a:extLst>
               <a:ext uri="{FF2B5EF4-FFF2-40B4-BE49-F238E27FC236}">
@@ -10532,7 +10674,7 @@
 </p:sld>
 </file>
 
-<file path=ppt/slides/slide34.xml><?xml version="1.0" encoding="utf-8"?>
+<file path=ppt/slides/slide36.xml><?xml version="1.0" encoding="utf-8"?>
 <p:sld xmlns:a="http://schemas.openxmlformats.org/drawingml/2006/main" xmlns:r="http://schemas.openxmlformats.org/officeDocument/2006/relationships" xmlns:p="http://schemas.openxmlformats.org/presentationml/2006/main">
   <p:cSld>
     <p:spTree>

</xml_diff>